<commit_message>
Improve slides for Week 2 - consume-first
Co-Authored-By: Llewellyn Falco <10874+isidore@users.noreply.github.com>
</commit_message>
<xml_diff>
--- a/TDD Microskills week 2.pptx
+++ b/TDD Microskills week 2.pptx
@@ -9286,6 +9286,357 @@
           </p:txBody>
         </p:sp>
       </p:grpSp>
+      <p:sp>
+        <p:nvSpPr>
+          <p:cNvPr id="16" name="Google Shape;198;p29">
+            <a:extLst>
+              <a:ext uri="{FF2B5EF4-FFF2-40B4-BE49-F238E27FC236}">
+                <a16:creationId xmlns:a16="http://schemas.microsoft.com/office/drawing/2014/main" id="{AE58CD2D-6A28-5143-BEF2-824F6DE1ACAC}"/>
+              </a:ext>
+            </a:extLst>
+          </p:cNvPr>
+          <p:cNvSpPr txBox="1">
+            <a:spLocks/>
+          </p:cNvSpPr>
+          <p:nvPr/>
+        </p:nvSpPr>
+        <p:spPr>
+          <a:xfrm>
+            <a:off x="5826514" y="1324500"/>
+            <a:ext cx="2472457" cy="1305000"/>
+          </a:xfrm>
+          <a:prstGeom prst="rect">
+            <a:avLst/>
+          </a:prstGeom>
+          <a:noFill/>
+          <a:ln>
+            <a:noFill/>
+          </a:ln>
+        </p:spPr>
+        <p:txBody>
+          <a:bodyPr spcFirstLastPara="1" wrap="square" lIns="91425" tIns="91425" rIns="91425" bIns="91425" anchor="t" anchorCtr="0">
+            <a:noAutofit/>
+          </a:bodyPr>
+          <a:lstStyle>
+            <a:defPPr marR="0" lvl="0" algn="l" rtl="0">
+              <a:lnSpc>
+                <a:spcPct val="100000"/>
+              </a:lnSpc>
+              <a:spcBef>
+                <a:spcPts val="0"/>
+              </a:spcBef>
+              <a:spcAft>
+                <a:spcPts val="0"/>
+              </a:spcAft>
+            </a:defPPr>
+            <a:lvl1pPr marL="457200" marR="0" lvl="0" indent="-330200" algn="l" rtl="0">
+              <a:lnSpc>
+                <a:spcPct val="100000"/>
+              </a:lnSpc>
+              <a:spcBef>
+                <a:spcPts val="600"/>
+              </a:spcBef>
+              <a:spcAft>
+                <a:spcPts val="0"/>
+              </a:spcAft>
+              <a:buClr>
+                <a:schemeClr val="dk1"/>
+              </a:buClr>
+              <a:buSzPts val="1600"/>
+              <a:buFont typeface="PT Serif"/>
+              <a:buChar char="▣"/>
+              <a:defRPr sz="1600" b="0" i="0" u="none" strike="noStrike" cap="none">
+                <a:solidFill>
+                  <a:schemeClr val="dk1"/>
+                </a:solidFill>
+                <a:latin typeface="PT Serif"/>
+                <a:ea typeface="PT Serif"/>
+                <a:cs typeface="PT Serif"/>
+                <a:sym typeface="PT Serif"/>
+              </a:defRPr>
+            </a:lvl1pPr>
+            <a:lvl2pPr marL="914400" marR="0" lvl="1" indent="-330200" algn="l" rtl="0">
+              <a:lnSpc>
+                <a:spcPct val="100000"/>
+              </a:lnSpc>
+              <a:spcBef>
+                <a:spcPts val="0"/>
+              </a:spcBef>
+              <a:spcAft>
+                <a:spcPts val="0"/>
+              </a:spcAft>
+              <a:buClr>
+                <a:schemeClr val="dk1"/>
+              </a:buClr>
+              <a:buSzPts val="1600"/>
+              <a:buFont typeface="PT Serif"/>
+              <a:buChar char="○"/>
+              <a:defRPr sz="1600" b="0" i="0" u="none" strike="noStrike" cap="none">
+                <a:solidFill>
+                  <a:schemeClr val="dk1"/>
+                </a:solidFill>
+                <a:latin typeface="PT Serif"/>
+                <a:ea typeface="PT Serif"/>
+                <a:cs typeface="PT Serif"/>
+                <a:sym typeface="PT Serif"/>
+              </a:defRPr>
+            </a:lvl2pPr>
+            <a:lvl3pPr marL="1371600" marR="0" lvl="2" indent="-330200" algn="l" rtl="0">
+              <a:lnSpc>
+                <a:spcPct val="100000"/>
+              </a:lnSpc>
+              <a:spcBef>
+                <a:spcPts val="0"/>
+              </a:spcBef>
+              <a:spcAft>
+                <a:spcPts val="0"/>
+              </a:spcAft>
+              <a:buClr>
+                <a:schemeClr val="dk1"/>
+              </a:buClr>
+              <a:buSzPts val="1600"/>
+              <a:buFont typeface="PT Serif"/>
+              <a:buChar char="■"/>
+              <a:defRPr sz="1600" b="0" i="0" u="none" strike="noStrike" cap="none">
+                <a:solidFill>
+                  <a:schemeClr val="dk1"/>
+                </a:solidFill>
+                <a:latin typeface="PT Serif"/>
+                <a:ea typeface="PT Serif"/>
+                <a:cs typeface="PT Serif"/>
+                <a:sym typeface="PT Serif"/>
+              </a:defRPr>
+            </a:lvl3pPr>
+            <a:lvl4pPr marL="1828800" marR="0" lvl="3" indent="-330200" algn="l" rtl="0">
+              <a:lnSpc>
+                <a:spcPct val="100000"/>
+              </a:lnSpc>
+              <a:spcBef>
+                <a:spcPts val="0"/>
+              </a:spcBef>
+              <a:spcAft>
+                <a:spcPts val="0"/>
+              </a:spcAft>
+              <a:buClr>
+                <a:schemeClr val="dk1"/>
+              </a:buClr>
+              <a:buSzPts val="1600"/>
+              <a:buFont typeface="PT Serif"/>
+              <a:buChar char="●"/>
+              <a:defRPr sz="1600" b="0" i="0" u="none" strike="noStrike" cap="none">
+                <a:solidFill>
+                  <a:schemeClr val="dk1"/>
+                </a:solidFill>
+                <a:latin typeface="PT Serif"/>
+                <a:ea typeface="PT Serif"/>
+                <a:cs typeface="PT Serif"/>
+                <a:sym typeface="PT Serif"/>
+              </a:defRPr>
+            </a:lvl4pPr>
+            <a:lvl5pPr marL="2286000" marR="0" lvl="4" indent="-330200" algn="l" rtl="0">
+              <a:lnSpc>
+                <a:spcPct val="100000"/>
+              </a:lnSpc>
+              <a:spcBef>
+                <a:spcPts val="0"/>
+              </a:spcBef>
+              <a:spcAft>
+                <a:spcPts val="0"/>
+              </a:spcAft>
+              <a:buClr>
+                <a:schemeClr val="dk1"/>
+              </a:buClr>
+              <a:buSzPts val="1600"/>
+              <a:buFont typeface="PT Serif"/>
+              <a:buChar char="○"/>
+              <a:defRPr sz="1600" b="0" i="0" u="none" strike="noStrike" cap="none">
+                <a:solidFill>
+                  <a:schemeClr val="dk1"/>
+                </a:solidFill>
+                <a:latin typeface="PT Serif"/>
+                <a:ea typeface="PT Serif"/>
+                <a:cs typeface="PT Serif"/>
+                <a:sym typeface="PT Serif"/>
+              </a:defRPr>
+            </a:lvl5pPr>
+            <a:lvl6pPr marL="2743200" marR="0" lvl="5" indent="-330200" algn="l" rtl="0">
+              <a:lnSpc>
+                <a:spcPct val="100000"/>
+              </a:lnSpc>
+              <a:spcBef>
+                <a:spcPts val="0"/>
+              </a:spcBef>
+              <a:spcAft>
+                <a:spcPts val="0"/>
+              </a:spcAft>
+              <a:buClr>
+                <a:schemeClr val="dk1"/>
+              </a:buClr>
+              <a:buSzPts val="1600"/>
+              <a:buFont typeface="PT Serif"/>
+              <a:buChar char="■"/>
+              <a:defRPr sz="1600" b="0" i="0" u="none" strike="noStrike" cap="none">
+                <a:solidFill>
+                  <a:schemeClr val="dk1"/>
+                </a:solidFill>
+                <a:latin typeface="PT Serif"/>
+                <a:ea typeface="PT Serif"/>
+                <a:cs typeface="PT Serif"/>
+                <a:sym typeface="PT Serif"/>
+              </a:defRPr>
+            </a:lvl6pPr>
+            <a:lvl7pPr marL="3200400" marR="0" lvl="6" indent="-330200" algn="l" rtl="0">
+              <a:lnSpc>
+                <a:spcPct val="100000"/>
+              </a:lnSpc>
+              <a:spcBef>
+                <a:spcPts val="0"/>
+              </a:spcBef>
+              <a:spcAft>
+                <a:spcPts val="0"/>
+              </a:spcAft>
+              <a:buClr>
+                <a:schemeClr val="dk1"/>
+              </a:buClr>
+              <a:buSzPts val="1600"/>
+              <a:buFont typeface="PT Serif"/>
+              <a:buChar char="●"/>
+              <a:defRPr sz="1600" b="0" i="0" u="none" strike="noStrike" cap="none">
+                <a:solidFill>
+                  <a:schemeClr val="dk1"/>
+                </a:solidFill>
+                <a:latin typeface="PT Serif"/>
+                <a:ea typeface="PT Serif"/>
+                <a:cs typeface="PT Serif"/>
+                <a:sym typeface="PT Serif"/>
+              </a:defRPr>
+            </a:lvl7pPr>
+            <a:lvl8pPr marL="3657600" marR="0" lvl="7" indent="-330200" algn="l" rtl="0">
+              <a:lnSpc>
+                <a:spcPct val="100000"/>
+              </a:lnSpc>
+              <a:spcBef>
+                <a:spcPts val="0"/>
+              </a:spcBef>
+              <a:spcAft>
+                <a:spcPts val="0"/>
+              </a:spcAft>
+              <a:buClr>
+                <a:schemeClr val="dk1"/>
+              </a:buClr>
+              <a:buSzPts val="1600"/>
+              <a:buFont typeface="PT Serif"/>
+              <a:buChar char="○"/>
+              <a:defRPr sz="1600" b="0" i="0" u="none" strike="noStrike" cap="none">
+                <a:solidFill>
+                  <a:schemeClr val="dk1"/>
+                </a:solidFill>
+                <a:latin typeface="PT Serif"/>
+                <a:ea typeface="PT Serif"/>
+                <a:cs typeface="PT Serif"/>
+                <a:sym typeface="PT Serif"/>
+              </a:defRPr>
+            </a:lvl8pPr>
+            <a:lvl9pPr marL="4114800" marR="0" lvl="8" indent="-330200" algn="l" rtl="0">
+              <a:lnSpc>
+                <a:spcPct val="100000"/>
+              </a:lnSpc>
+              <a:spcBef>
+                <a:spcPts val="0"/>
+              </a:spcBef>
+              <a:spcAft>
+                <a:spcPts val="0"/>
+              </a:spcAft>
+              <a:buClr>
+                <a:schemeClr val="dk1"/>
+              </a:buClr>
+              <a:buSzPts val="1600"/>
+              <a:buFont typeface="PT Serif"/>
+              <a:buChar char="■"/>
+              <a:defRPr sz="1600" b="0" i="0" u="none" strike="noStrike" cap="none">
+                <a:solidFill>
+                  <a:schemeClr val="dk1"/>
+                </a:solidFill>
+                <a:latin typeface="PT Serif"/>
+                <a:ea typeface="PT Serif"/>
+                <a:cs typeface="PT Serif"/>
+                <a:sym typeface="PT Serif"/>
+              </a:defRPr>
+            </a:lvl9pPr>
+          </a:lstStyle>
+          <a:p>
+            <a:pPr marL="0" indent="0" algn="ctr">
+              <a:buFont typeface="PT Serif"/>
+              <a:buNone/>
+            </a:pPr>
+            <a:r>
+              <a:rPr lang="en-US" b="1" i="1" dirty="0">
+                <a:latin typeface="Playfair Display"/>
+                <a:ea typeface="Playfair Display"/>
+                <a:cs typeface="Playfair Display"/>
+                <a:sym typeface="Playfair Display"/>
+              </a:rPr>
+              <a:t>Evaluate the consequences</a:t>
+            </a:r>
+          </a:p>
+          <a:p>
+            <a:pPr marL="0" indent="0" algn="ctr">
+              <a:buFont typeface="PT Serif"/>
+              <a:buNone/>
+            </a:pPr>
+            <a:r>
+              <a:rPr lang="en-US" sz="1200" dirty="0"/>
+              <a:t>Ask yourself “what are the resulting </a:t>
+            </a:r>
+            <a:r>
+              <a:rPr lang="en-US" sz="1200" b="1" i="1" dirty="0"/>
+              <a:t>classes</a:t>
+            </a:r>
+            <a:r>
+              <a:rPr lang="en-US" sz="1200" dirty="0"/>
+              <a:t> and </a:t>
+            </a:r>
+            <a:r>
+              <a:rPr lang="en-US" sz="1200" b="1" i="1" dirty="0"/>
+              <a:t>methods</a:t>
+            </a:r>
+            <a:r>
+              <a:rPr lang="en-US" sz="1200" dirty="0"/>
+              <a:t> from this implementation?”</a:t>
+            </a:r>
+          </a:p>
+        </p:txBody>
+      </p:sp>
+      <p:pic>
+        <p:nvPicPr>
+          <p:cNvPr id="5" name="Picture 4" descr="Shape, arrow&#10;&#10;Description automatically generated">
+            <a:extLst>
+              <a:ext uri="{FF2B5EF4-FFF2-40B4-BE49-F238E27FC236}">
+                <a16:creationId xmlns:a16="http://schemas.microsoft.com/office/drawing/2014/main" id="{4DA4E062-3E96-874C-986C-9A1424CA7C8C}"/>
+              </a:ext>
+            </a:extLst>
+          </p:cNvPr>
+          <p:cNvPicPr>
+            <a:picLocks noChangeAspect="1"/>
+          </p:cNvPicPr>
+          <p:nvPr/>
+        </p:nvPicPr>
+        <p:blipFill>
+          <a:blip r:embed="rId3"/>
+          <a:stretch>
+            <a:fillRect/>
+          </a:stretch>
+        </p:blipFill>
+        <p:spPr>
+          <a:xfrm>
+            <a:off x="6921548" y="1172963"/>
+            <a:ext cx="282388" cy="282388"/>
+          </a:xfrm>
+          <a:prstGeom prst="rect">
+            <a:avLst/>
+          </a:prstGeom>
+        </p:spPr>
+      </p:pic>
     </p:spTree>
     <p:extLst>
       <p:ext uri="{BB962C8B-B14F-4D97-AF65-F5344CB8AC3E}">
@@ -15035,8 +15386,8 @@
         </p:nvSpPr>
         <p:spPr>
           <a:xfrm>
-            <a:off x="5413143" y="951004"/>
-            <a:ext cx="3341912" cy="1305000"/>
+            <a:off x="4793129" y="951004"/>
+            <a:ext cx="3961926" cy="1305000"/>
           </a:xfrm>
           <a:prstGeom prst="rect">
             <a:avLst/>
@@ -15327,7 +15678,21 @@
             </a:r>
             <a:r>
               <a:rPr lang="en-US" sz="1200" dirty="0"/>
-              <a:t> draft. There will never be an easier time to refactor </a:t>
+              <a:t> draft.</a:t>
+            </a:r>
+            <a:br>
+              <a:rPr lang="en-US" sz="1200" dirty="0"/>
+            </a:br>
+            <a:r>
+              <a:rPr lang="en-US" sz="1200" dirty="0"/>
+              <a:t>The better your English is, the better the code will be.</a:t>
+            </a:r>
+            <a:br>
+              <a:rPr lang="en-US" sz="1200" dirty="0"/>
+            </a:br>
+            <a:r>
+              <a:rPr lang="en-US" sz="1200" dirty="0"/>
+              <a:t>There will never be an easier time to refactor </a:t>
             </a:r>
           </a:p>
           <a:p>
@@ -15403,7 +15768,7 @@
         </p:nvGrpSpPr>
         <p:grpSpPr>
           <a:xfrm>
-            <a:off x="6928185" y="727921"/>
+            <a:off x="6623393" y="727921"/>
             <a:ext cx="345971" cy="325505"/>
             <a:chOff x="5972700" y="2330200"/>
             <a:chExt cx="411625" cy="387275"/>
@@ -21914,6 +22279,123 @@
           </p:txBody>
         </p:sp>
       </p:grpSp>
+      <p:sp>
+        <p:nvSpPr>
+          <p:cNvPr id="2" name="TextBox 1">
+            <a:extLst>
+              <a:ext uri="{FF2B5EF4-FFF2-40B4-BE49-F238E27FC236}">
+                <a16:creationId xmlns:a16="http://schemas.microsoft.com/office/drawing/2014/main" id="{B1FF9062-AD5D-1847-9844-54CB32D6F3FC}"/>
+              </a:ext>
+            </a:extLst>
+          </p:cNvPr>
+          <p:cNvSpPr txBox="1"/>
+          <p:nvPr/>
+        </p:nvSpPr>
+        <p:spPr>
+          <a:xfrm>
+            <a:off x="1320799" y="4020042"/>
+            <a:ext cx="304800" cy="307777"/>
+          </a:xfrm>
+          <a:prstGeom prst="rect">
+            <a:avLst/>
+          </a:prstGeom>
+          <a:noFill/>
+        </p:spPr>
+        <p:txBody>
+          <a:bodyPr wrap="square" rtlCol="0">
+            <a:spAutoFit/>
+          </a:bodyPr>
+          <a:lstStyle/>
+          <a:p>
+            <a:r>
+              <a:rPr lang="en-GB" b="1" dirty="0">
+                <a:solidFill>
+                  <a:srgbClr val="00612B"/>
+                </a:solidFill>
+              </a:rPr>
+              <a:t>+</a:t>
+            </a:r>
+          </a:p>
+        </p:txBody>
+      </p:sp>
+      <p:sp>
+        <p:nvSpPr>
+          <p:cNvPr id="38" name="TextBox 37">
+            <a:extLst>
+              <a:ext uri="{FF2B5EF4-FFF2-40B4-BE49-F238E27FC236}">
+                <a16:creationId xmlns:a16="http://schemas.microsoft.com/office/drawing/2014/main" id="{7BCCF392-E00B-E441-A674-EE1D18958D2D}"/>
+              </a:ext>
+            </a:extLst>
+          </p:cNvPr>
+          <p:cNvSpPr txBox="1"/>
+          <p:nvPr/>
+        </p:nvSpPr>
+        <p:spPr>
+          <a:xfrm>
+            <a:off x="3759192" y="3780983"/>
+            <a:ext cx="304800" cy="307777"/>
+          </a:xfrm>
+          <a:prstGeom prst="rect">
+            <a:avLst/>
+          </a:prstGeom>
+          <a:noFill/>
+        </p:spPr>
+        <p:txBody>
+          <a:bodyPr wrap="square" rtlCol="0">
+            <a:spAutoFit/>
+          </a:bodyPr>
+          <a:lstStyle/>
+          <a:p>
+            <a:r>
+              <a:rPr lang="en-GB" b="1" dirty="0">
+                <a:solidFill>
+                  <a:srgbClr val="00612B"/>
+                </a:solidFill>
+              </a:rPr>
+              <a:t>+</a:t>
+            </a:r>
+          </a:p>
+        </p:txBody>
+      </p:sp>
+      <p:sp>
+        <p:nvSpPr>
+          <p:cNvPr id="39" name="TextBox 38">
+            <a:extLst>
+              <a:ext uri="{FF2B5EF4-FFF2-40B4-BE49-F238E27FC236}">
+                <a16:creationId xmlns:a16="http://schemas.microsoft.com/office/drawing/2014/main" id="{925FDB73-8E45-814F-90C6-935EAD0CA795}"/>
+              </a:ext>
+            </a:extLst>
+          </p:cNvPr>
+          <p:cNvSpPr txBox="1"/>
+          <p:nvPr/>
+        </p:nvSpPr>
+        <p:spPr>
+          <a:xfrm>
+            <a:off x="6394811" y="3972230"/>
+            <a:ext cx="304800" cy="307777"/>
+          </a:xfrm>
+          <a:prstGeom prst="rect">
+            <a:avLst/>
+          </a:prstGeom>
+          <a:noFill/>
+        </p:spPr>
+        <p:txBody>
+          <a:bodyPr wrap="square" rtlCol="0">
+            <a:spAutoFit/>
+          </a:bodyPr>
+          <a:lstStyle/>
+          <a:p>
+            <a:r>
+              <a:rPr lang="en-GB" b="1" dirty="0">
+                <a:solidFill>
+                  <a:srgbClr val="00612B"/>
+                </a:solidFill>
+              </a:rPr>
+              <a:t>+</a:t>
+            </a:r>
+          </a:p>
+        </p:txBody>
+      </p:sp>
     </p:spTree>
     <p:extLst>
       <p:ext uri="{BB962C8B-B14F-4D97-AF65-F5344CB8AC3E}">

</xml_diff>